<commit_message>
Adding expanded Hotspot (3), increasing Title, Hotspots Icon
</commit_message>
<xml_diff>
--- a/Minute madness Hotspots.pptx
+++ b/Minute madness Hotspots.pptx
@@ -288,7 +288,7 @@
           <a:p>
             <a:fld id="{B17185AB-3E62-8846-8D91-B5F6CB6DC199}" type="datetimeFigureOut">
               <a:rPr lang="en-US" smtClean="0"/>
-              <a:t>10/3/14</a:t>
+              <a:t>10/4/14</a:t>
             </a:fld>
             <a:endParaRPr lang="en-US"/>
           </a:p>
@@ -458,7 +458,7 @@
           <a:p>
             <a:fld id="{B17185AB-3E62-8846-8D91-B5F6CB6DC199}" type="datetimeFigureOut">
               <a:rPr lang="en-US" smtClean="0"/>
-              <a:t>10/3/14</a:t>
+              <a:t>10/4/14</a:t>
             </a:fld>
             <a:endParaRPr lang="en-US"/>
           </a:p>
@@ -638,7 +638,7 @@
           <a:p>
             <a:fld id="{B17185AB-3E62-8846-8D91-B5F6CB6DC199}" type="datetimeFigureOut">
               <a:rPr lang="en-US" smtClean="0"/>
-              <a:t>10/3/14</a:t>
+              <a:t>10/4/14</a:t>
             </a:fld>
             <a:endParaRPr lang="en-US"/>
           </a:p>
@@ -808,7 +808,7 @@
           <a:p>
             <a:fld id="{B17185AB-3E62-8846-8D91-B5F6CB6DC199}" type="datetimeFigureOut">
               <a:rPr lang="en-US" smtClean="0"/>
-              <a:t>10/3/14</a:t>
+              <a:t>10/4/14</a:t>
             </a:fld>
             <a:endParaRPr lang="en-US"/>
           </a:p>
@@ -1054,7 +1054,7 @@
           <a:p>
             <a:fld id="{B17185AB-3E62-8846-8D91-B5F6CB6DC199}" type="datetimeFigureOut">
               <a:rPr lang="en-US" smtClean="0"/>
-              <a:t>10/3/14</a:t>
+              <a:t>10/4/14</a:t>
             </a:fld>
             <a:endParaRPr lang="en-US"/>
           </a:p>
@@ -1342,7 +1342,7 @@
           <a:p>
             <a:fld id="{B17185AB-3E62-8846-8D91-B5F6CB6DC199}" type="datetimeFigureOut">
               <a:rPr lang="en-US" smtClean="0"/>
-              <a:t>10/3/14</a:t>
+              <a:t>10/4/14</a:t>
             </a:fld>
             <a:endParaRPr lang="en-US"/>
           </a:p>
@@ -1764,7 +1764,7 @@
           <a:p>
             <a:fld id="{B17185AB-3E62-8846-8D91-B5F6CB6DC199}" type="datetimeFigureOut">
               <a:rPr lang="en-US" smtClean="0"/>
-              <a:t>10/3/14</a:t>
+              <a:t>10/4/14</a:t>
             </a:fld>
             <a:endParaRPr lang="en-US"/>
           </a:p>
@@ -1882,7 +1882,7 @@
           <a:p>
             <a:fld id="{B17185AB-3E62-8846-8D91-B5F6CB6DC199}" type="datetimeFigureOut">
               <a:rPr lang="en-US" smtClean="0"/>
-              <a:t>10/3/14</a:t>
+              <a:t>10/4/14</a:t>
             </a:fld>
             <a:endParaRPr lang="en-US"/>
           </a:p>
@@ -1977,7 +1977,7 @@
           <a:p>
             <a:fld id="{B17185AB-3E62-8846-8D91-B5F6CB6DC199}" type="datetimeFigureOut">
               <a:rPr lang="en-US" smtClean="0"/>
-              <a:t>10/3/14</a:t>
+              <a:t>10/4/14</a:t>
             </a:fld>
             <a:endParaRPr lang="en-US"/>
           </a:p>
@@ -2254,7 +2254,7 @@
           <a:p>
             <a:fld id="{B17185AB-3E62-8846-8D91-B5F6CB6DC199}" type="datetimeFigureOut">
               <a:rPr lang="en-US" smtClean="0"/>
-              <a:t>10/3/14</a:t>
+              <a:t>10/4/14</a:t>
             </a:fld>
             <a:endParaRPr lang="en-US"/>
           </a:p>
@@ -2507,7 +2507,7 @@
           <a:p>
             <a:fld id="{B17185AB-3E62-8846-8D91-B5F6CB6DC199}" type="datetimeFigureOut">
               <a:rPr lang="en-US" smtClean="0"/>
-              <a:t>10/3/14</a:t>
+              <a:t>10/4/14</a:t>
             </a:fld>
             <a:endParaRPr lang="en-US"/>
           </a:p>
@@ -2720,7 +2720,7 @@
           <a:p>
             <a:fld id="{B17185AB-3E62-8846-8D91-B5F6CB6DC199}" type="datetimeFigureOut">
               <a:rPr lang="en-US" smtClean="0"/>
-              <a:t>10/3/14</a:t>
+              <a:t>10/4/14</a:t>
             </a:fld>
             <a:endParaRPr lang="en-US"/>
           </a:p>
@@ -3306,7 +3306,7 @@
         </p:nvSpPr>
         <p:spPr>
           <a:xfrm>
-            <a:off x="3459231" y="3702939"/>
+            <a:off x="3465744" y="3702939"/>
             <a:ext cx="858762" cy="2642222"/>
           </a:xfrm>
           <a:prstGeom prst="rect">
@@ -3396,54 +3396,6 @@
       </p:sp>
       <p:sp>
         <p:nvSpPr>
-          <p:cNvPr id="21" name="Rectangle 20"/>
-          <p:cNvSpPr/>
-          <p:nvPr/>
-        </p:nvSpPr>
-        <p:spPr>
-          <a:xfrm>
-            <a:off x="7096310" y="3702939"/>
-            <a:ext cx="584158" cy="2642222"/>
-          </a:xfrm>
-          <a:prstGeom prst="rect">
-            <a:avLst/>
-          </a:prstGeom>
-          <a:solidFill>
-            <a:srgbClr val="FF0000">
-              <a:alpha val="22000"/>
-            </a:srgbClr>
-          </a:solidFill>
-          <a:ln w="19050" cmpd="sng">
-            <a:solidFill>
-              <a:srgbClr val="FF0000"/>
-            </a:solidFill>
-          </a:ln>
-        </p:spPr>
-        <p:style>
-          <a:lnRef idx="1">
-            <a:schemeClr val="accent1"/>
-          </a:lnRef>
-          <a:fillRef idx="3">
-            <a:schemeClr val="accent1"/>
-          </a:fillRef>
-          <a:effectRef idx="2">
-            <a:schemeClr val="accent1"/>
-          </a:effectRef>
-          <a:fontRef idx="minor">
-            <a:schemeClr val="lt1"/>
-          </a:fontRef>
-        </p:style>
-        <p:txBody>
-          <a:bodyPr rtlCol="0" anchor="ctr"/>
-          <a:lstStyle/>
-          <a:p>
-            <a:pPr algn="ctr"/>
-            <a:endParaRPr lang="en-US"/>
-          </a:p>
-        </p:txBody>
-      </p:sp>
-      <p:sp>
-        <p:nvSpPr>
           <p:cNvPr id="22" name="Rectangle 21"/>
           <p:cNvSpPr/>
           <p:nvPr/>
@@ -3468,14 +3420,7 @@
                 <a:latin typeface="Helvetica Neue"/>
                 <a:cs typeface="Helvetica Neue"/>
               </a:rPr>
-              <a:t>   +   </a:t>
-            </a:r>
-            <a:r>
-              <a:rPr lang="en-US" sz="3200" b="1" dirty="0" smtClean="0">
-                <a:latin typeface="Helvetica Neue"/>
-                <a:cs typeface="Helvetica Neue"/>
-              </a:rPr>
-              <a:t> </a:t>
+              <a:t>   +    </a:t>
             </a:r>
             <a:r>
               <a:rPr lang="en-US" sz="3200" b="1" dirty="0">
@@ -3749,7 +3694,7 @@
           <a:lstStyle/>
           <a:p>
             <a:pPr algn="ctr"/>
-            <a:endParaRPr lang="en-US"/>
+            <a:endParaRPr lang="en-US" dirty="0"/>
           </a:p>
         </p:txBody>
       </p:sp>
@@ -3887,15 +3832,13 @@
         </p:nvSpPr>
         <p:spPr>
           <a:xfrm>
-            <a:off x="1532474" y="101357"/>
-            <a:ext cx="6353613" cy="461665"/>
+            <a:off x="1282085" y="101357"/>
+            <a:ext cx="7740965" cy="707886"/>
           </a:xfrm>
           <a:prstGeom prst="rect">
             <a:avLst/>
           </a:prstGeom>
-          <a:solidFill>
-            <a:schemeClr val="bg1"/>
-          </a:solidFill>
+          <a:noFill/>
           <a:ln>
             <a:noFill/>
           </a:ln>
@@ -3914,27 +3857,38 @@
           <a:lstStyle/>
           <a:p>
             <a:r>
-              <a:rPr lang="en-US" sz="2400" b="1" dirty="0" smtClean="0">
+              <a:rPr lang="en-US" sz="4000" b="1" dirty="0">
+                <a:latin typeface="Helvetica Neue"/>
+                <a:cs typeface="Helvetica Neue"/>
+              </a:rPr>
+              <a:t>T</a:t>
+            </a:r>
+            <a:r>
+              <a:rPr lang="en-US" sz="4000" b="1" dirty="0">
+                <a:latin typeface="Helvetica Neue"/>
+                <a:cs typeface="Helvetica Neue"/>
+              </a:rPr>
+              <a:t>he</a:t>
+            </a:r>
+            <a:r>
+              <a:rPr lang="en-US" sz="2800" b="1" dirty="0" smtClean="0">
+                <a:latin typeface="Helvetica Neue"/>
+                <a:cs typeface="Helvetica Neue"/>
+              </a:rPr>
+              <a:t> </a:t>
+            </a:r>
+            <a:r>
+              <a:rPr lang="en-US" sz="4000" b="1" dirty="0" err="1" smtClean="0">
                 <a:solidFill>
                   <a:srgbClr val="FF0000"/>
                 </a:solidFill>
                 <a:latin typeface="Helvetica Neue"/>
                 <a:cs typeface="Helvetica Neue"/>
               </a:rPr>
-              <a:t>…</a:t>
-            </a:r>
-            <a:r>
-              <a:rPr lang="en-US" sz="2400" b="1" dirty="0" smtClean="0">
-                <a:solidFill>
-                  <a:srgbClr val="008000"/>
-                </a:solidFill>
-                <a:latin typeface="Helvetica Neue"/>
-                <a:cs typeface="Helvetica Neue"/>
-              </a:rPr>
-              <a:t> </a:t>
-            </a:r>
-            <a:r>
-              <a:rPr lang="en-US" sz="2400" b="1" dirty="0" smtClean="0">
+              <a:t>SixthSense</a:t>
+            </a:r>
+            <a:r>
+              <a:rPr lang="en-US" sz="4000" b="1" dirty="0" smtClean="0">
                 <a:solidFill>
                   <a:srgbClr val="FF0000"/>
                 </a:solidFill>
@@ -3944,47 +3898,186 @@
               <a:t> </a:t>
             </a:r>
             <a:r>
-              <a:rPr lang="en-US" sz="2400" b="1" dirty="0" smtClean="0">
+              <a:rPr lang="en-US" sz="4000" b="1" dirty="0" smtClean="0">
                 <a:latin typeface="Helvetica Neue"/>
                 <a:cs typeface="Helvetica Neue"/>
               </a:rPr>
-              <a:t>What </a:t>
-            </a:r>
-            <a:r>
-              <a:rPr lang="en-US" sz="2400" b="1" dirty="0" smtClean="0">
-                <a:latin typeface="Helvetica Neue"/>
-                <a:cs typeface="Helvetica Neue"/>
-              </a:rPr>
-              <a:t>is the “</a:t>
-            </a:r>
-            <a:r>
-              <a:rPr lang="en-US" sz="2400" b="1" dirty="0" err="1" smtClean="0">
-                <a:latin typeface="Helvetica Neue"/>
-                <a:cs typeface="Helvetica Neue"/>
-              </a:rPr>
-              <a:t>SixthSense</a:t>
-            </a:r>
-            <a:r>
-              <a:rPr lang="en-US" sz="2400" b="1" dirty="0" smtClean="0">
-                <a:latin typeface="Helvetica Neue"/>
-                <a:cs typeface="Helvetica Neue"/>
-              </a:rPr>
-              <a:t> Interaction</a:t>
-            </a:r>
-            <a:r>
-              <a:rPr lang="en-US" sz="2400" b="1" dirty="0" smtClean="0">
-                <a:latin typeface="Helvetica Neue"/>
-                <a:cs typeface="Helvetica Neue"/>
-              </a:rPr>
-              <a:t>”?? </a:t>
-            </a:r>
-            <a:endParaRPr lang="en-US" sz="2400" b="1" dirty="0">
+              <a:t>Interaction </a:t>
+            </a:r>
+            <a:endParaRPr lang="en-US" sz="4000" b="1" dirty="0">
               <a:latin typeface="Helvetica Neue"/>
               <a:cs typeface="Helvetica Neue"/>
             </a:endParaRPr>
           </a:p>
         </p:txBody>
       </p:sp>
+      <p:pic>
+        <p:nvPicPr>
+          <p:cNvPr id="2" name="Picture 1"/>
+          <p:cNvPicPr>
+            <a:picLocks noChangeAspect="1"/>
+          </p:cNvPicPr>
+          <p:nvPr/>
+        </p:nvPicPr>
+        <p:blipFill rotWithShape="1">
+          <a:blip r:embed="rId10"/>
+          <a:srcRect/>
+          <a:stretch/>
+        </p:blipFill>
+        <p:spPr>
+          <a:xfrm>
+            <a:off x="6742793" y="4272410"/>
+            <a:ext cx="1469004" cy="1907128"/>
+          </a:xfrm>
+          <a:prstGeom prst="rect">
+            <a:avLst/>
+          </a:prstGeom>
+        </p:spPr>
+      </p:pic>
+      <p:sp>
+        <p:nvSpPr>
+          <p:cNvPr id="21" name="Rectangle 20"/>
+          <p:cNvSpPr/>
+          <p:nvPr/>
+        </p:nvSpPr>
+        <p:spPr>
+          <a:xfrm>
+            <a:off x="7082665" y="3702940"/>
+            <a:ext cx="730851" cy="2642222"/>
+          </a:xfrm>
+          <a:prstGeom prst="rect">
+            <a:avLst/>
+          </a:prstGeom>
+          <a:solidFill>
+            <a:srgbClr val="FF0000">
+              <a:alpha val="22000"/>
+            </a:srgbClr>
+          </a:solidFill>
+          <a:ln w="19050" cmpd="sng">
+            <a:solidFill>
+              <a:srgbClr val="FF0000"/>
+            </a:solidFill>
+          </a:ln>
+        </p:spPr>
+        <p:style>
+          <a:lnRef idx="1">
+            <a:schemeClr val="accent1"/>
+          </a:lnRef>
+          <a:fillRef idx="3">
+            <a:schemeClr val="accent1"/>
+          </a:fillRef>
+          <a:effectRef idx="2">
+            <a:schemeClr val="accent1"/>
+          </a:effectRef>
+          <a:fontRef idx="minor">
+            <a:schemeClr val="lt1"/>
+          </a:fontRef>
+        </p:style>
+        <p:txBody>
+          <a:bodyPr rtlCol="0" anchor="ctr"/>
+          <a:lstStyle/>
+          <a:p>
+            <a:pPr algn="ctr"/>
+            <a:endParaRPr lang="en-US"/>
+          </a:p>
+        </p:txBody>
+      </p:sp>
+      <p:pic>
+        <p:nvPicPr>
+          <p:cNvPr id="14" name="Picture 13"/>
+          <p:cNvPicPr>
+            <a:picLocks noChangeAspect="1"/>
+          </p:cNvPicPr>
+          <p:nvPr/>
+        </p:nvPicPr>
+        <p:blipFill>
+          <a:blip r:embed="rId11"/>
+          <a:stretch>
+            <a:fillRect/>
+          </a:stretch>
+        </p:blipFill>
+        <p:spPr>
+          <a:xfrm>
+            <a:off x="7096581" y="3201609"/>
+            <a:ext cx="475038" cy="424368"/>
+          </a:xfrm>
+          <a:prstGeom prst="rect">
+            <a:avLst/>
+          </a:prstGeom>
+        </p:spPr>
+      </p:pic>
+      <p:pic>
+        <p:nvPicPr>
+          <p:cNvPr id="24" name="Picture 23"/>
+          <p:cNvPicPr>
+            <a:picLocks noChangeAspect="1"/>
+          </p:cNvPicPr>
+          <p:nvPr/>
+        </p:nvPicPr>
+        <p:blipFill>
+          <a:blip r:embed="rId11"/>
+          <a:stretch>
+            <a:fillRect/>
+          </a:stretch>
+        </p:blipFill>
+        <p:spPr>
+          <a:xfrm>
+            <a:off x="3519640" y="5860400"/>
+            <a:ext cx="316626" cy="282853"/>
+          </a:xfrm>
+          <a:prstGeom prst="rect">
+            <a:avLst/>
+          </a:prstGeom>
+        </p:spPr>
+      </p:pic>
+      <p:pic>
+        <p:nvPicPr>
+          <p:cNvPr id="26" name="Picture 25"/>
+          <p:cNvPicPr>
+            <a:picLocks noChangeAspect="1"/>
+          </p:cNvPicPr>
+          <p:nvPr/>
+        </p:nvPicPr>
+        <p:blipFill>
+          <a:blip r:embed="rId11"/>
+          <a:stretch>
+            <a:fillRect/>
+          </a:stretch>
+        </p:blipFill>
+        <p:spPr>
+          <a:xfrm>
+            <a:off x="5237612" y="5859271"/>
+            <a:ext cx="316626" cy="282853"/>
+          </a:xfrm>
+          <a:prstGeom prst="rect">
+            <a:avLst/>
+          </a:prstGeom>
+        </p:spPr>
+      </p:pic>
+      <p:pic>
+        <p:nvPicPr>
+          <p:cNvPr id="28" name="Picture 27"/>
+          <p:cNvPicPr>
+            <a:picLocks noChangeAspect="1"/>
+          </p:cNvPicPr>
+          <p:nvPr/>
+        </p:nvPicPr>
+        <p:blipFill>
+          <a:blip r:embed="rId11"/>
+          <a:stretch>
+            <a:fillRect/>
+          </a:stretch>
+        </p:blipFill>
+        <p:spPr>
+          <a:xfrm>
+            <a:off x="7082665" y="5859271"/>
+            <a:ext cx="316626" cy="282853"/>
+          </a:xfrm>
+          <a:prstGeom prst="rect">
+            <a:avLst/>
+          </a:prstGeom>
+        </p:spPr>
+      </p:pic>
     </p:spTree>
     <p:extLst>
       <p:ext uri="{BB962C8B-B14F-4D97-AF65-F5344CB8AC3E}">

</xml_diff>